<commit_message>
add about warnings & errors
</commit_message>
<xml_diff>
--- a/sessions/1-R-taster.pptx
+++ b/sessions/1-R-taster.pptx
@@ -5,7 +5,7 @@
     <p:sldMasterId id="2147483648" r:id="rId1"/>
   </p:sldMasterIdLst>
   <p:notesMasterIdLst>
-    <p:NotesMasterId r:id="rId18"/>
+    <p:NotesMasterId r:id="rId19"/>
   </p:notesMasterIdLst>
   <p:sldIdLst>
     <p:sldId id="256" r:id="rId2"/>
@@ -24,6 +24,7 @@
     <p:sldId id="269" r:id="rId15"/>
     <p:sldId id="270" r:id="rId16"/>
     <p:sldId id="271" r:id="rId17"/>
+    <p:sldId id="272" r:id="rId18"/>
   </p:sldIdLst>
   <p:sldSz cx="12192000" cy="6858000"/>
   <p:notesSz cx="6858000" cy="9144000"/>
@@ -4286,95 +4287,131 @@
             </a:pPr>
             <a:r>
               <a:rPr/>
-              <a:t>Instructor</a:t>
-            </a:r>
-            <a:r>
-              <a:rPr/>
-              <a:t> </a:t>
-            </a:r>
-            <a:r>
-              <a:rPr/>
-              <a:t>to</a:t>
-            </a:r>
-            <a:r>
-              <a:rPr/>
-              <a:t> </a:t>
-            </a:r>
-            <a:r>
-              <a:rPr/>
-              <a:t>switch</a:t>
-            </a:r>
-            <a:r>
-              <a:rPr/>
-              <a:t> </a:t>
-            </a:r>
-            <a:r>
-              <a:rPr/>
-              <a:t>to</a:t>
-            </a:r>
-            <a:r>
-              <a:rPr/>
-              <a:t> </a:t>
-            </a:r>
-            <a:r>
-              <a:rPr/>
-              <a:t>live</a:t>
-            </a:r>
-            <a:r>
-              <a:rPr/>
-              <a:t> </a:t>
-            </a:r>
-            <a:r>
-              <a:rPr/>
-              <a:t>demo</a:t>
-            </a:r>
-            <a:r>
-              <a:rPr/>
-              <a:t> </a:t>
-            </a:r>
-            <a:r>
-              <a:rPr/>
-              <a:t>in</a:t>
-            </a:r>
-            <a:r>
-              <a:rPr/>
-              <a:t> </a:t>
-            </a:r>
-            <a:r>
-              <a:rPr/>
-              <a:t>RStudio</a:t>
-            </a:r>
-            <a:r>
-              <a:rPr/>
-              <a:t> </a:t>
-            </a:r>
-            <a:r>
-              <a:rPr/>
-              <a:t>(remaining</a:t>
-            </a:r>
-            <a:r>
-              <a:rPr/>
-              <a:t> </a:t>
-            </a:r>
-            <a:r>
-              <a:rPr/>
-              <a:t>slides</a:t>
-            </a:r>
-            <a:r>
-              <a:rPr/>
-              <a:t> </a:t>
-            </a:r>
-            <a:r>
-              <a:rPr/>
-              <a:t>for</a:t>
-            </a:r>
-            <a:r>
-              <a:rPr/>
-              <a:t> </a:t>
-            </a:r>
-            <a:r>
-              <a:rPr/>
-              <a:t>info)</a:t>
+              <a:t>A</a:t>
+            </a:r>
+            <a:r>
+              <a:rPr/>
+              <a:t> </a:t>
+            </a:r>
+            <a:r>
+              <a:rPr/>
+              <a:t>warning</a:t>
+            </a:r>
+            <a:r>
+              <a:rPr/>
+              <a:t> </a:t>
+            </a:r>
+            <a:r>
+              <a:rPr/>
+              <a:t>about</a:t>
+            </a:r>
+            <a:r>
+              <a:rPr/>
+              <a:t> </a:t>
+            </a:r>
+            <a:r>
+              <a:rPr/>
+              <a:t>R</a:t>
+            </a:r>
+            <a:r>
+              <a:rPr/>
+              <a:t> </a:t>
+            </a:r>
+            <a:r>
+              <a:rPr/>
+              <a:t>warnings</a:t>
+            </a:r>
+            <a:r>
+              <a:rPr/>
+              <a:t> </a:t>
+            </a:r>
+            <a:r>
+              <a:rPr/>
+              <a:t>&amp;</a:t>
+            </a:r>
+            <a:r>
+              <a:rPr/>
+              <a:t> </a:t>
+            </a:r>
+            <a:r>
+              <a:rPr/>
+              <a:t>errors</a:t>
+            </a:r>
+          </a:p>
+        </p:txBody>
+      </p:sp>
+      <p:sp>
+        <p:nvSpPr>
+          <p:cNvPr id="3" name="Content Placeholder 2">
+            <a:extLst>
+              <a:ext uri="{FF2B5EF4-FFF2-40B4-BE49-F238E27FC236}">
+                <a16:creationId xmlns:a16="http://schemas.microsoft.com/office/drawing/2014/main" id="{D10DDA37-E46B-B641-BC9F-636CB92A2C08}"/>
+              </a:ext>
+            </a:extLst>
+          </p:cNvPr>
+          <p:cNvSpPr>
+            <a:spLocks noGrp="1"/>
+          </p:cNvSpPr>
+          <p:nvPr>
+            <p:ph idx="1"/>
+          </p:nvPr>
+        </p:nvSpPr>
+        <p:spPr/>
+        <p:txBody>
+          <a:bodyPr/>
+          <a:lstStyle/>
+          <a:p>
+            <a:pPr lvl="0" marL="0" indent="0">
+              <a:buNone/>
+            </a:pPr>
+            <a:r>
+              <a:rPr/>
+              <a:t>DON’T PANIC : they are common &amp; expected</a:t>
+            </a:r>
+          </a:p>
+          <a:p>
+            <a:pPr lvl="0" marL="0" indent="0">
+              <a:buNone/>
+            </a:pPr>
+            <a:r>
+              <a:rPr sz="1800">
+                <a:latin typeface="Courier"/>
+              </a:rPr>
+              <a:t>Warnings</a:t>
+            </a:r>
+            <a:r>
+              <a:rPr/>
+              <a:t> give you info that often you can ignore</a:t>
+            </a:r>
+          </a:p>
+          <a:p>
+            <a:pPr lvl="0" marL="0" indent="0">
+              <a:buNone/>
+            </a:pPr>
+            <a:r>
+              <a:rPr sz="1800">
+                <a:latin typeface="Courier"/>
+              </a:rPr>
+              <a:t>Errors</a:t>
+            </a:r>
+            <a:r>
+              <a:rPr/>
+              <a:t> usually need to be fixed and are usually due to a typo</a:t>
+            </a:r>
+          </a:p>
+          <a:p>
+            <a:pPr lvl="0" marL="0" indent="0">
+              <a:buNone/>
+            </a:pPr>
+            <a:r>
+              <a:rPr sz="1800">
+                <a:latin typeface="Courier"/>
+              </a:rPr>
+              <a:t>Errors</a:t>
+            </a:r>
+            <a:r>
+              <a:rPr/>
+              <a:t> check the first one - if it doesn’t make sense to you google it</a:t>
             </a:r>
           </a:p>
         </p:txBody>
@@ -4385,6 +4422,147 @@
 </file>
 
 <file path=ppt/slides/slide11.xml><?xml version="1.0" encoding="utf-8"?>
+<p:sld xmlns:a="http://schemas.openxmlformats.org/drawingml/2006/main" xmlns:r="http://schemas.openxmlformats.org/officeDocument/2006/relationships" xmlns:p="http://schemas.openxmlformats.org/presentationml/2006/main">
+  <p:cSld>
+    <p:spTree>
+      <p:nvGrpSpPr>
+        <p:cNvPr id="1" name=""/>
+        <p:cNvGrpSpPr/>
+        <p:nvPr/>
+      </p:nvGrpSpPr>
+      <p:grpSpPr>
+        <a:xfrm>
+          <a:off x="0" y="0"/>
+          <a:ext cx="0" cy="0"/>
+          <a:chOff x="0" y="0"/>
+          <a:chExt cx="0" cy="0"/>
+        </a:xfrm>
+      </p:grpSpPr>
+      <p:sp>
+        <p:nvSpPr>
+          <p:cNvPr id="2" name="Title 1">
+            <a:extLst>
+              <a:ext uri="{FF2B5EF4-FFF2-40B4-BE49-F238E27FC236}">
+                <a16:creationId xmlns:a16="http://schemas.microsoft.com/office/drawing/2014/main" id="{5567D468-EE70-CD4E-A3AC-039CC11EF1FB}"/>
+              </a:ext>
+            </a:extLst>
+          </p:cNvPr>
+          <p:cNvSpPr>
+            <a:spLocks noGrp="1"/>
+          </p:cNvSpPr>
+          <p:nvPr>
+            <p:ph type="title"/>
+          </p:nvPr>
+        </p:nvSpPr>
+        <p:spPr/>
+        <p:txBody>
+          <a:bodyPr/>
+          <a:lstStyle/>
+          <a:p>
+            <a:pPr lvl="0" marL="0" indent="0">
+              <a:buNone/>
+            </a:pPr>
+            <a:r>
+              <a:rPr/>
+              <a:t>Instructor</a:t>
+            </a:r>
+            <a:r>
+              <a:rPr/>
+              <a:t> </a:t>
+            </a:r>
+            <a:r>
+              <a:rPr/>
+              <a:t>to</a:t>
+            </a:r>
+            <a:r>
+              <a:rPr/>
+              <a:t> </a:t>
+            </a:r>
+            <a:r>
+              <a:rPr/>
+              <a:t>switch</a:t>
+            </a:r>
+            <a:r>
+              <a:rPr/>
+              <a:t> </a:t>
+            </a:r>
+            <a:r>
+              <a:rPr/>
+              <a:t>to</a:t>
+            </a:r>
+            <a:r>
+              <a:rPr/>
+              <a:t> </a:t>
+            </a:r>
+            <a:r>
+              <a:rPr/>
+              <a:t>live</a:t>
+            </a:r>
+            <a:r>
+              <a:rPr/>
+              <a:t> </a:t>
+            </a:r>
+            <a:r>
+              <a:rPr/>
+              <a:t>demo</a:t>
+            </a:r>
+            <a:r>
+              <a:rPr/>
+              <a:t> </a:t>
+            </a:r>
+            <a:r>
+              <a:rPr/>
+              <a:t>in</a:t>
+            </a:r>
+            <a:r>
+              <a:rPr/>
+              <a:t> </a:t>
+            </a:r>
+            <a:r>
+              <a:rPr/>
+              <a:t>RStudio</a:t>
+            </a:r>
+            <a:r>
+              <a:rPr/>
+              <a:t> </a:t>
+            </a:r>
+            <a:r>
+              <a:rPr/>
+              <a:t>(remaining</a:t>
+            </a:r>
+            <a:r>
+              <a:rPr/>
+              <a:t> </a:t>
+            </a:r>
+            <a:r>
+              <a:rPr/>
+              <a:t>slides</a:t>
+            </a:r>
+            <a:r>
+              <a:rPr/>
+              <a:t> </a:t>
+            </a:r>
+            <a:r>
+              <a:rPr/>
+              <a:t>for</a:t>
+            </a:r>
+            <a:r>
+              <a:rPr/>
+              <a:t> </a:t>
+            </a:r>
+            <a:r>
+              <a:rPr/>
+              <a:t>info)</a:t>
+            </a:r>
+          </a:p>
+        </p:txBody>
+      </p:sp>
+    </p:spTree>
+  </p:cSld>
+</p:sld>
+</file>
+
+<file path=ppt/slides/slide12.xml><?xml version="1.0" encoding="utf-8"?>
 <p:sld xmlns:a="http://schemas.openxmlformats.org/drawingml/2006/main" xmlns:r="http://schemas.openxmlformats.org/officeDocument/2006/relationships" xmlns:p="http://schemas.openxmlformats.org/presentationml/2006/main">
   <p:cSld>
     <p:spTree>
@@ -4515,7 +4693,7 @@
 </p:sld>
 </file>
 
-<file path=ppt/slides/slide12.xml><?xml version="1.0" encoding="utf-8"?>
+<file path=ppt/slides/slide13.xml><?xml version="1.0" encoding="utf-8"?>
 <p:sld xmlns:a="http://schemas.openxmlformats.org/drawingml/2006/main" xmlns:r="http://schemas.openxmlformats.org/officeDocument/2006/relationships" xmlns:p="http://schemas.openxmlformats.org/presentationml/2006/main">
   <p:cSld>
     <p:spTree>
@@ -4567,7 +4745,7 @@
 </p:sld>
 </file>
 
-<file path=ppt/slides/slide13.xml><?xml version="1.0" encoding="utf-8"?>
+<file path=ppt/slides/slide14.xml><?xml version="1.0" encoding="utf-8"?>
 <p:sld xmlns:a="http://schemas.openxmlformats.org/drawingml/2006/main" xmlns:r="http://schemas.openxmlformats.org/officeDocument/2006/relationships" xmlns:p="http://schemas.openxmlformats.org/presentationml/2006/main">
   <p:cSld>
     <p:spTree>
@@ -4619,7 +4797,7 @@
 </p:sld>
 </file>
 
-<file path=ppt/slides/slide14.xml><?xml version="1.0" encoding="utf-8"?>
+<file path=ppt/slides/slide15.xml><?xml version="1.0" encoding="utf-8"?>
 <p:sld xmlns:a="http://schemas.openxmlformats.org/drawingml/2006/main" xmlns:r="http://schemas.openxmlformats.org/officeDocument/2006/relationships" xmlns:p="http://schemas.openxmlformats.org/presentationml/2006/main">
   <p:cSld>
     <p:spTree>
@@ -4736,7 +4914,7 @@
 </p:sld>
 </file>
 
-<file path=ppt/slides/slide15.xml><?xml version="1.0" encoding="utf-8"?>
+<file path=ppt/slides/slide16.xml><?xml version="1.0" encoding="utf-8"?>
 <p:sld xmlns:a="http://schemas.openxmlformats.org/drawingml/2006/main" xmlns:r="http://schemas.openxmlformats.org/officeDocument/2006/relationships" xmlns:p="http://schemas.openxmlformats.org/presentationml/2006/main">
   <p:cSld>
     <p:spTree>
@@ -4867,7 +5045,7 @@
 </p:sld>
 </file>
 
-<file path=ppt/slides/slide16.xml><?xml version="1.0" encoding="utf-8"?>
+<file path=ppt/slides/slide17.xml><?xml version="1.0" encoding="utf-8"?>
 <p:sld xmlns:a="http://schemas.openxmlformats.org/drawingml/2006/main" xmlns:r="http://schemas.openxmlformats.org/officeDocument/2006/relationships" xmlns:p="http://schemas.openxmlformats.org/presentationml/2006/main">
   <p:cSld>
     <p:spTree>

</xml_diff>

<commit_message>
update for independent learners
</commit_message>
<xml_diff>
--- a/sessions/1-R-taster.pptx
+++ b/sessions/1-R-taster.pptx
@@ -5,7 +5,7 @@
     <p:sldMasterId id="2147483648" r:id="rId1"/>
   </p:sldMasterIdLst>
   <p:notesMasterIdLst>
-    <p:NotesMasterId r:id="rId19"/>
+    <p:NotesMasterId r:id="rId18"/>
   </p:notesMasterIdLst>
   <p:sldIdLst>
     <p:sldId id="256" r:id="rId2"/>
@@ -24,7 +24,6 @@
     <p:sldId id="269" r:id="rId15"/>
     <p:sldId id="270" r:id="rId16"/>
     <p:sldId id="271" r:id="rId17"/>
-    <p:sldId id="272" r:id="rId18"/>
   </p:sldIdLst>
   <p:sldSz cx="12192000" cy="6858000"/>
   <p:notesSz cx="6858000" cy="9144000"/>
@@ -4287,55 +4286,87 @@
             </a:pPr>
             <a:r>
               <a:rPr/>
-              <a:t>A</a:t>
-            </a:r>
-            <a:r>
-              <a:rPr/>
-              <a:t> </a:t>
-            </a:r>
-            <a:r>
-              <a:rPr/>
-              <a:t>warning</a:t>
-            </a:r>
-            <a:r>
-              <a:rPr/>
-              <a:t> </a:t>
-            </a:r>
-            <a:r>
-              <a:rPr/>
-              <a:t>about</a:t>
-            </a:r>
-            <a:r>
-              <a:rPr/>
-              <a:t> </a:t>
-            </a:r>
-            <a:r>
-              <a:rPr/>
-              <a:t>R</a:t>
-            </a:r>
-            <a:r>
-              <a:rPr/>
-              <a:t> </a:t>
-            </a:r>
-            <a:r>
-              <a:rPr/>
-              <a:t>warnings</a:t>
-            </a:r>
-            <a:r>
-              <a:rPr/>
-              <a:t> </a:t>
-            </a:r>
-            <a:r>
-              <a:rPr/>
-              <a:t>&amp;</a:t>
-            </a:r>
-            <a:r>
-              <a:rPr/>
-              <a:t> </a:t>
-            </a:r>
-            <a:r>
-              <a:rPr/>
-              <a:t>errors</a:t>
+              <a:t>If</a:t>
+            </a:r>
+            <a:r>
+              <a:rPr/>
+              <a:t> </a:t>
+            </a:r>
+            <a:r>
+              <a:rPr/>
+              <a:t>you</a:t>
+            </a:r>
+            <a:r>
+              <a:rPr/>
+              <a:t> </a:t>
+            </a:r>
+            <a:r>
+              <a:rPr/>
+              <a:t>are</a:t>
+            </a:r>
+            <a:r>
+              <a:rPr/>
+              <a:t> </a:t>
+            </a:r>
+            <a:r>
+              <a:rPr/>
+              <a:t>an</a:t>
+            </a:r>
+            <a:r>
+              <a:rPr/>
+              <a:t> </a:t>
+            </a:r>
+            <a:r>
+              <a:rPr/>
+              <a:t>Instructor</a:t>
+            </a:r>
+            <a:r>
+              <a:rPr/>
+              <a:t> </a:t>
+            </a:r>
+            <a:r>
+              <a:rPr/>
+              <a:t>switch</a:t>
+            </a:r>
+            <a:r>
+              <a:rPr/>
+              <a:t> </a:t>
+            </a:r>
+            <a:r>
+              <a:rPr/>
+              <a:t>to</a:t>
+            </a:r>
+            <a:r>
+              <a:rPr/>
+              <a:t> </a:t>
+            </a:r>
+            <a:r>
+              <a:rPr/>
+              <a:t>live</a:t>
+            </a:r>
+            <a:r>
+              <a:rPr/>
+              <a:t> </a:t>
+            </a:r>
+            <a:r>
+              <a:rPr/>
+              <a:t>demo</a:t>
+            </a:r>
+            <a:r>
+              <a:rPr/>
+              <a:t> </a:t>
+            </a:r>
+            <a:r>
+              <a:rPr/>
+              <a:t>in</a:t>
+            </a:r>
+            <a:r>
+              <a:rPr/>
+              <a:t> </a:t>
+            </a:r>
+            <a:r>
+              <a:rPr/>
+              <a:t>RStudio</a:t>
             </a:r>
           </a:p>
         </p:txBody>
@@ -4366,52 +4397,7 @@
             </a:pPr>
             <a:r>
               <a:rPr/>
-              <a:t>DON’T PANIC : they are common &amp; expected</a:t>
-            </a:r>
-          </a:p>
-          <a:p>
-            <a:pPr lvl="0" marL="0" indent="0">
-              <a:buNone/>
-            </a:pPr>
-            <a:r>
-              <a:rPr sz="1800">
-                <a:latin typeface="Courier"/>
-              </a:rPr>
-              <a:t>Warnings</a:t>
-            </a:r>
-            <a:r>
-              <a:rPr/>
-              <a:t> give you info that often you can ignore</a:t>
-            </a:r>
-          </a:p>
-          <a:p>
-            <a:pPr lvl="0" marL="0" indent="0">
-              <a:buNone/>
-            </a:pPr>
-            <a:r>
-              <a:rPr sz="1800">
-                <a:latin typeface="Courier"/>
-              </a:rPr>
-              <a:t>Errors</a:t>
-            </a:r>
-            <a:r>
-              <a:rPr/>
-              <a:t> usually need to be fixed and are usually due to a typo</a:t>
-            </a:r>
-          </a:p>
-          <a:p>
-            <a:pPr lvl="0" marL="0" indent="0">
-              <a:buNone/>
-            </a:pPr>
-            <a:r>
-              <a:rPr sz="1800">
-                <a:latin typeface="Courier"/>
-              </a:rPr>
-              <a:t>Errors</a:t>
-            </a:r>
-            <a:r>
-              <a:rPr/>
-              <a:t> check the first one - if it doesn’t make sense to you google it</a:t>
+              <a:t>If you are learning independently follow the steps in these slides.</a:t>
             </a:r>
           </a:p>
         </p:txBody>
@@ -4422,147 +4408,6 @@
 </file>
 
 <file path=ppt/slides/slide11.xml><?xml version="1.0" encoding="utf-8"?>
-<p:sld xmlns:a="http://schemas.openxmlformats.org/drawingml/2006/main" xmlns:r="http://schemas.openxmlformats.org/officeDocument/2006/relationships" xmlns:p="http://schemas.openxmlformats.org/presentationml/2006/main">
-  <p:cSld>
-    <p:spTree>
-      <p:nvGrpSpPr>
-        <p:cNvPr id="1" name=""/>
-        <p:cNvGrpSpPr/>
-        <p:nvPr/>
-      </p:nvGrpSpPr>
-      <p:grpSpPr>
-        <a:xfrm>
-          <a:off x="0" y="0"/>
-          <a:ext cx="0" cy="0"/>
-          <a:chOff x="0" y="0"/>
-          <a:chExt cx="0" cy="0"/>
-        </a:xfrm>
-      </p:grpSpPr>
-      <p:sp>
-        <p:nvSpPr>
-          <p:cNvPr id="2" name="Title 1">
-            <a:extLst>
-              <a:ext uri="{FF2B5EF4-FFF2-40B4-BE49-F238E27FC236}">
-                <a16:creationId xmlns:a16="http://schemas.microsoft.com/office/drawing/2014/main" id="{5567D468-EE70-CD4E-A3AC-039CC11EF1FB}"/>
-              </a:ext>
-            </a:extLst>
-          </p:cNvPr>
-          <p:cNvSpPr>
-            <a:spLocks noGrp="1"/>
-          </p:cNvSpPr>
-          <p:nvPr>
-            <p:ph type="title"/>
-          </p:nvPr>
-        </p:nvSpPr>
-        <p:spPr/>
-        <p:txBody>
-          <a:bodyPr/>
-          <a:lstStyle/>
-          <a:p>
-            <a:pPr lvl="0" marL="0" indent="0">
-              <a:buNone/>
-            </a:pPr>
-            <a:r>
-              <a:rPr/>
-              <a:t>Instructor</a:t>
-            </a:r>
-            <a:r>
-              <a:rPr/>
-              <a:t> </a:t>
-            </a:r>
-            <a:r>
-              <a:rPr/>
-              <a:t>to</a:t>
-            </a:r>
-            <a:r>
-              <a:rPr/>
-              <a:t> </a:t>
-            </a:r>
-            <a:r>
-              <a:rPr/>
-              <a:t>switch</a:t>
-            </a:r>
-            <a:r>
-              <a:rPr/>
-              <a:t> </a:t>
-            </a:r>
-            <a:r>
-              <a:rPr/>
-              <a:t>to</a:t>
-            </a:r>
-            <a:r>
-              <a:rPr/>
-              <a:t> </a:t>
-            </a:r>
-            <a:r>
-              <a:rPr/>
-              <a:t>live</a:t>
-            </a:r>
-            <a:r>
-              <a:rPr/>
-              <a:t> </a:t>
-            </a:r>
-            <a:r>
-              <a:rPr/>
-              <a:t>demo</a:t>
-            </a:r>
-            <a:r>
-              <a:rPr/>
-              <a:t> </a:t>
-            </a:r>
-            <a:r>
-              <a:rPr/>
-              <a:t>in</a:t>
-            </a:r>
-            <a:r>
-              <a:rPr/>
-              <a:t> </a:t>
-            </a:r>
-            <a:r>
-              <a:rPr/>
-              <a:t>RStudio</a:t>
-            </a:r>
-            <a:r>
-              <a:rPr/>
-              <a:t> </a:t>
-            </a:r>
-            <a:r>
-              <a:rPr/>
-              <a:t>(remaining</a:t>
-            </a:r>
-            <a:r>
-              <a:rPr/>
-              <a:t> </a:t>
-            </a:r>
-            <a:r>
-              <a:rPr/>
-              <a:t>slides</a:t>
-            </a:r>
-            <a:r>
-              <a:rPr/>
-              <a:t> </a:t>
-            </a:r>
-            <a:r>
-              <a:rPr/>
-              <a:t>for</a:t>
-            </a:r>
-            <a:r>
-              <a:rPr/>
-              <a:t> </a:t>
-            </a:r>
-            <a:r>
-              <a:rPr/>
-              <a:t>info)</a:t>
-            </a:r>
-          </a:p>
-        </p:txBody>
-      </p:sp>
-    </p:spTree>
-  </p:cSld>
-</p:sld>
-</file>
-
-<file path=ppt/slides/slide12.xml><?xml version="1.0" encoding="utf-8"?>
 <p:sld xmlns:a="http://schemas.openxmlformats.org/drawingml/2006/main" xmlns:r="http://schemas.openxmlformats.org/officeDocument/2006/relationships" xmlns:p="http://schemas.openxmlformats.org/presentationml/2006/main">
   <p:cSld>
     <p:spTree>
@@ -4693,7 +4538,7 @@
 </p:sld>
 </file>
 
-<file path=ppt/slides/slide13.xml><?xml version="1.0" encoding="utf-8"?>
+<file path=ppt/slides/slide12.xml><?xml version="1.0" encoding="utf-8"?>
 <p:sld xmlns:a="http://schemas.openxmlformats.org/drawingml/2006/main" xmlns:r="http://schemas.openxmlformats.org/officeDocument/2006/relationships" xmlns:p="http://schemas.openxmlformats.org/presentationml/2006/main">
   <p:cSld>
     <p:spTree>
@@ -4745,7 +4590,7 @@
 </p:sld>
 </file>
 
-<file path=ppt/slides/slide14.xml><?xml version="1.0" encoding="utf-8"?>
+<file path=ppt/slides/slide13.xml><?xml version="1.0" encoding="utf-8"?>
 <p:sld xmlns:a="http://schemas.openxmlformats.org/drawingml/2006/main" xmlns:r="http://schemas.openxmlformats.org/officeDocument/2006/relationships" xmlns:p="http://schemas.openxmlformats.org/presentationml/2006/main">
   <p:cSld>
     <p:spTree>
@@ -4797,7 +4642,7 @@
 </p:sld>
 </file>
 
-<file path=ppt/slides/slide15.xml><?xml version="1.0" encoding="utf-8"?>
+<file path=ppt/slides/slide14.xml><?xml version="1.0" encoding="utf-8"?>
 <p:sld xmlns:a="http://schemas.openxmlformats.org/drawingml/2006/main" xmlns:r="http://schemas.openxmlformats.org/officeDocument/2006/relationships" xmlns:p="http://schemas.openxmlformats.org/presentationml/2006/main">
   <p:cSld>
     <p:spTree>
@@ -4914,7 +4759,7 @@
 </p:sld>
 </file>
 
-<file path=ppt/slides/slide16.xml><?xml version="1.0" encoding="utf-8"?>
+<file path=ppt/slides/slide15.xml><?xml version="1.0" encoding="utf-8"?>
 <p:sld xmlns:a="http://schemas.openxmlformats.org/drawingml/2006/main" xmlns:r="http://schemas.openxmlformats.org/officeDocument/2006/relationships" xmlns:p="http://schemas.openxmlformats.org/presentationml/2006/main">
   <p:cSld>
     <p:spTree>
@@ -5045,7 +4890,7 @@
 </p:sld>
 </file>
 
-<file path=ppt/slides/slide17.xml><?xml version="1.0" encoding="utf-8"?>
+<file path=ppt/slides/slide16.xml><?xml version="1.0" encoding="utf-8"?>
 <p:sld xmlns:a="http://schemas.openxmlformats.org/drawingml/2006/main" xmlns:r="http://schemas.openxmlformats.org/officeDocument/2006/relationships" xmlns:p="http://schemas.openxmlformats.org/presentationml/2006/main">
   <p:cSld>
     <p:spTree>
@@ -6209,23 +6054,55 @@
             </a:pPr>
             <a:r>
               <a:rPr/>
-              <a:t>Saving</a:t>
-            </a:r>
-            <a:r>
-              <a:rPr/>
-              <a:t> </a:t>
-            </a:r>
-            <a:r>
-              <a:rPr/>
-              <a:t>your</a:t>
-            </a:r>
-            <a:r>
-              <a:rPr/>
-              <a:t> </a:t>
-            </a:r>
-            <a:r>
-              <a:rPr/>
-              <a:t>work</a:t>
+              <a:t>A</a:t>
+            </a:r>
+            <a:r>
+              <a:rPr/>
+              <a:t> </a:t>
+            </a:r>
+            <a:r>
+              <a:rPr/>
+              <a:t>warning</a:t>
+            </a:r>
+            <a:r>
+              <a:rPr/>
+              <a:t> </a:t>
+            </a:r>
+            <a:r>
+              <a:rPr/>
+              <a:t>about</a:t>
+            </a:r>
+            <a:r>
+              <a:rPr/>
+              <a:t> </a:t>
+            </a:r>
+            <a:r>
+              <a:rPr/>
+              <a:t>R</a:t>
+            </a:r>
+            <a:r>
+              <a:rPr/>
+              <a:t> </a:t>
+            </a:r>
+            <a:r>
+              <a:rPr/>
+              <a:t>warnings</a:t>
+            </a:r>
+            <a:r>
+              <a:rPr/>
+              <a:t> </a:t>
+            </a:r>
+            <a:r>
+              <a:rPr/>
+              <a:t>&amp;</a:t>
+            </a:r>
+            <a:r>
+              <a:rPr/>
+              <a:t> </a:t>
+            </a:r>
+            <a:r>
+              <a:rPr/>
+              <a:t>errors</a:t>
             </a:r>
           </a:p>
         </p:txBody>
@@ -6251,55 +6128,57 @@
           <a:bodyPr/>
           <a:lstStyle/>
           <a:p>
-            <a:pPr lvl="1"/>
-            <a:r>
-              <a:rPr/>
-              <a:t>Click the </a:t>
-            </a:r>
+            <a:pPr lvl="0" marL="0" indent="0">
+              <a:buNone/>
+            </a:pPr>
+            <a:r>
+              <a:rPr/>
+              <a:t>DON’T PANIC : they are common &amp; expected</a:t>
+            </a:r>
+          </a:p>
+          <a:p>
+            <a:pPr lvl="0" marL="0" indent="0">
+              <a:buNone/>
+            </a:pPr>
             <a:r>
               <a:rPr sz="1800">
                 <a:latin typeface="Courier"/>
               </a:rPr>
-              <a:t>save</a:t>
-            </a:r>
-            <a:r>
-              <a:rPr/>
-              <a:t> icon</a:t>
-            </a:r>
-          </a:p>
-          <a:p>
-            <a:pPr lvl="2"/>
-            <a:r>
-              <a:rPr/>
-              <a:t>Save the file under a meaningful name.</a:t>
-            </a:r>
-          </a:p>
-          <a:p>
-            <a:pPr lvl="2"/>
-            <a:r>
-              <a:rPr/>
-              <a:t>Save it somewhere you can find it again.</a:t>
-            </a:r>
-          </a:p>
-          <a:p>
-            <a:pPr lvl="2"/>
-            <a:r>
-              <a:rPr/>
-              <a:t>.R is the file extension for R scripts.</a:t>
-            </a:r>
-          </a:p>
-          <a:p>
-            <a:pPr lvl="1"/>
-            <a:r>
-              <a:rPr/>
-              <a:t>If you were to close RStudio</a:t>
-            </a:r>
-          </a:p>
-          <a:p>
-            <a:pPr lvl="1"/>
-            <a:r>
-              <a:rPr/>
-              <a:t>The file would remain &amp; you could run again.</a:t>
+              <a:t>Warnings</a:t>
+            </a:r>
+            <a:r>
+              <a:rPr/>
+              <a:t> give you info that often you can ignore</a:t>
+            </a:r>
+          </a:p>
+          <a:p>
+            <a:pPr lvl="0" marL="0" indent="0">
+              <a:buNone/>
+            </a:pPr>
+            <a:r>
+              <a:rPr sz="1800">
+                <a:latin typeface="Courier"/>
+              </a:rPr>
+              <a:t>Errors</a:t>
+            </a:r>
+            <a:r>
+              <a:rPr/>
+              <a:t> usually need to be fixed and are usually due to a typo</a:t>
+            </a:r>
+          </a:p>
+          <a:p>
+            <a:pPr lvl="0" marL="0" indent="0">
+              <a:buNone/>
+            </a:pPr>
+            <a:r>
+              <a:rPr sz="1800">
+                <a:latin typeface="Courier"/>
+              </a:rPr>
+              <a:t>Errors</a:t>
+            </a:r>
+            <a:r>
+              <a:rPr/>
+              <a:t> check the first one - if it doesn’t make sense to you google it</a:t>
             </a:r>
           </a:p>
         </p:txBody>

</xml_diff>